<commit_message>
Added some comments about cross validation at the end
</commit_message>
<xml_diff>
--- a/lectures/Lect05_Lasso.pptx
+++ b/lectures/Lect05_Lasso.pptx
@@ -5,7 +5,7 @@
     <p:sldMasterId id="2147483648" r:id="rId1"/>
   </p:sldMasterIdLst>
   <p:notesMasterIdLst>
-    <p:notesMasterId r:id="rId42"/>
+    <p:notesMasterId r:id="rId44"/>
   </p:notesMasterIdLst>
   <p:sldIdLst>
     <p:sldId id="258" r:id="rId2"/>
@@ -47,7 +47,9 @@
     <p:sldId id="390" r:id="rId38"/>
     <p:sldId id="391" r:id="rId39"/>
     <p:sldId id="392" r:id="rId40"/>
-    <p:sldId id="394" r:id="rId41"/>
+    <p:sldId id="397" r:id="rId41"/>
+    <p:sldId id="398" r:id="rId42"/>
+    <p:sldId id="394" r:id="rId43"/>
   </p:sldIdLst>
   <p:sldSz cx="12192000" cy="6858000"/>
   <p:notesSz cx="7315200" cy="9601200"/>
@@ -247,7 +249,7 @@
           <a:p>
             <a:fld id="{B7D6DDD3-D7E9-488B-B626-1E8285E424D8}" type="datetimeFigureOut">
               <a:rPr lang="en-US" smtClean="0"/>
-              <a:t>2/10/18</a:t>
+              <a:t>2/13/18</a:t>
             </a:fld>
             <a:endParaRPr lang="en-US"/>
           </a:p>
@@ -999,7 +1001,7 @@
           <a:p>
             <a:fld id="{65CF6084-2C3C-4FE7-B181-D16A3429058A}" type="slidenum">
               <a:rPr lang="en-US" smtClean="0"/>
-              <a:t>40</a:t>
+              <a:t>42</a:t>
             </a:fld>
             <a:endParaRPr lang="en-US"/>
           </a:p>
@@ -5526,8 +5528,8 @@
           </a:p>
         </p:txBody>
       </p:sp>
-      <mc:AlternateContent xmlns:mc="http://schemas.openxmlformats.org/markup-compatibility/2006">
-        <mc:Choice xmlns:a14="http://schemas.microsoft.com/office/drawing/2010/main" Requires="a14">
+      <mc:AlternateContent xmlns:mc="http://schemas.openxmlformats.org/markup-compatibility/2006" xmlns:a14="http://schemas.microsoft.com/office/drawing/2010/main">
+        <mc:Choice Requires="a14">
           <p:sp>
             <p:nvSpPr>
               <p:cNvPr id="3" name="Content Placeholder 2">
@@ -5956,7 +5958,7 @@
             </p:txBody>
           </p:sp>
         </mc:Choice>
-        <mc:Fallback>
+        <mc:Fallback xmlns="">
           <p:sp>
             <p:nvSpPr>
               <p:cNvPr id="3" name="Content Placeholder 2">
@@ -6096,8 +6098,8 @@
             </a:extLst>
           </p:spPr>
         </p:pic>
-        <mc:AlternateContent xmlns:mc="http://schemas.openxmlformats.org/markup-compatibility/2006">
-          <mc:Choice xmlns:a14="http://schemas.microsoft.com/office/drawing/2010/main" Requires="a14">
+        <mc:AlternateContent xmlns:mc="http://schemas.openxmlformats.org/markup-compatibility/2006" xmlns:a14="http://schemas.microsoft.com/office/drawing/2010/main">
+          <mc:Choice Requires="a14">
             <p:sp>
               <p:nvSpPr>
                 <p:cNvPr id="5" name="TextBox 4">
@@ -6198,7 +6200,7 @@
               </p:txBody>
             </p:sp>
           </mc:Choice>
-          <mc:Fallback>
+          <mc:Fallback xmlns="">
             <p:sp>
               <p:nvSpPr>
                 <p:cNvPr id="5" name="TextBox 4">
@@ -6243,8 +6245,8 @@
             </p:sp>
           </mc:Fallback>
         </mc:AlternateContent>
-        <mc:AlternateContent xmlns:mc="http://schemas.openxmlformats.org/markup-compatibility/2006">
-          <mc:Choice xmlns:a14="http://schemas.microsoft.com/office/drawing/2010/main" Requires="a14">
+        <mc:AlternateContent xmlns:mc="http://schemas.openxmlformats.org/markup-compatibility/2006" xmlns:a14="http://schemas.microsoft.com/office/drawing/2010/main">
+          <mc:Choice Requires="a14">
             <p:sp>
               <p:nvSpPr>
                 <p:cNvPr id="7" name="TextBox 6">
@@ -6326,7 +6328,7 @@
               </p:txBody>
             </p:sp>
           </mc:Choice>
-          <mc:Fallback>
+          <mc:Fallback xmlns="">
             <p:sp>
               <p:nvSpPr>
                 <p:cNvPr id="7" name="TextBox 6">
@@ -6371,8 +6373,8 @@
             </p:sp>
           </mc:Fallback>
         </mc:AlternateContent>
-        <mc:AlternateContent xmlns:mc="http://schemas.openxmlformats.org/markup-compatibility/2006">
-          <mc:Choice xmlns:a14="http://schemas.microsoft.com/office/drawing/2010/main" Requires="a14">
+        <mc:AlternateContent xmlns:mc="http://schemas.openxmlformats.org/markup-compatibility/2006" xmlns:a14="http://schemas.microsoft.com/office/drawing/2010/main">
+          <mc:Choice Requires="a14">
             <p:sp>
               <p:nvSpPr>
                 <p:cNvPr id="6" name="Rectangle 5">
@@ -6440,7 +6442,7 @@
               </p:txBody>
             </p:sp>
           </mc:Choice>
-          <mc:Fallback>
+          <mc:Fallback xmlns="">
             <p:sp>
               <p:nvSpPr>
                 <p:cNvPr id="6" name="Rectangle 5">
@@ -6486,8 +6488,8 @@
           </mc:Fallback>
         </mc:AlternateContent>
       </p:grpSp>
-      <mc:AlternateContent xmlns:mc="http://schemas.openxmlformats.org/markup-compatibility/2006">
-        <mc:Choice xmlns:a14="http://schemas.microsoft.com/office/drawing/2010/main" Requires="a14">
+      <mc:AlternateContent xmlns:mc="http://schemas.openxmlformats.org/markup-compatibility/2006" xmlns:a14="http://schemas.microsoft.com/office/drawing/2010/main">
+        <mc:Choice Requires="a14">
           <p:sp>
             <p:nvSpPr>
               <p:cNvPr id="9" name="TextBox 8">
@@ -6657,7 +6659,7 @@
             </p:txBody>
           </p:sp>
         </mc:Choice>
-        <mc:Fallback>
+        <mc:Fallback xmlns="">
           <p:sp>
             <p:nvSpPr>
               <p:cNvPr id="9" name="TextBox 8">
@@ -6760,8 +6762,8 @@
           </a:p>
         </p:txBody>
       </p:sp>
-      <mc:AlternateContent xmlns:mc="http://schemas.openxmlformats.org/markup-compatibility/2006">
-        <mc:Choice xmlns:a14="http://schemas.microsoft.com/office/drawing/2010/main" Requires="a14">
+      <mc:AlternateContent xmlns:mc="http://schemas.openxmlformats.org/markup-compatibility/2006" xmlns:a14="http://schemas.microsoft.com/office/drawing/2010/main">
+        <mc:Choice Requires="a14">
           <p:sp>
             <p:nvSpPr>
               <p:cNvPr id="3" name="Content Placeholder 2">
@@ -7280,7 +7282,7 @@
             </p:txBody>
           </p:sp>
         </mc:Choice>
-        <mc:Fallback>
+        <mc:Fallback xmlns="">
           <p:sp>
             <p:nvSpPr>
               <p:cNvPr id="3" name="Content Placeholder 2">
@@ -7407,8 +7409,8 @@
           </a:p>
         </p:txBody>
       </p:sp>
-      <mc:AlternateContent xmlns:mc="http://schemas.openxmlformats.org/markup-compatibility/2006">
-        <mc:Choice xmlns:a14="http://schemas.microsoft.com/office/drawing/2010/main" Requires="a14">
+      <mc:AlternateContent xmlns:mc="http://schemas.openxmlformats.org/markup-compatibility/2006" xmlns:a14="http://schemas.microsoft.com/office/drawing/2010/main">
+        <mc:Choice Requires="a14">
           <p:sp>
             <p:nvSpPr>
               <p:cNvPr id="3" name="Content Placeholder 2">
@@ -7459,12 +7461,6 @@
                       </a:rPr>
                       <m:t>𝐽</m:t>
                     </m:r>
-                    <m:r>
-                      <a:rPr lang="en-US" b="0" i="1" smtClean="0">
-                        <a:latin typeface="Cambria Math" panose="02040503050406030204" pitchFamily="18" charset="0"/>
-                      </a:rPr>
-                      <m:t>=</m:t>
-                    </m:r>
                     <m:d>
                       <m:dPr>
                         <m:ctrlPr>
@@ -7482,6 +7478,12 @@
                         </m:r>
                       </m:e>
                     </m:d>
+                    <m:r>
+                      <a:rPr lang="en-US" b="1" i="1" smtClean="0">
+                        <a:latin typeface="Cambria Math" panose="02040503050406030204" pitchFamily="18" charset="0"/>
+                      </a:rPr>
+                      <m:t>=</m:t>
+                    </m:r>
                     <m:nary>
                       <m:naryPr>
                         <m:chr m:val="∑"/>
@@ -7783,13 +7785,7 @@
                           <a:rPr lang="en-US" b="0" i="1" smtClean="0">
                             <a:latin typeface="Cambria Math" panose="02040503050406030204" pitchFamily="18" charset="0"/>
                           </a:rPr>
-                          <m:t> </m:t>
-                        </m:r>
-                        <m:r>
-                          <a:rPr lang="en-US" b="0" i="1" smtClean="0">
-                            <a:latin typeface="Cambria Math" panose="02040503050406030204" pitchFamily="18" charset="0"/>
-                          </a:rPr>
-                          <m:t>2</m:t>
+                          <m:t> 2</m:t>
                         </m:r>
                       </m:sup>
                     </m:sSup>
@@ -8301,7 +8297,7 @@
             </p:txBody>
           </p:sp>
         </mc:Choice>
-        <mc:Fallback>
+        <mc:Fallback xmlns="">
           <p:sp>
             <p:nvSpPr>
               <p:cNvPr id="3" name="Content Placeholder 2">
@@ -8643,8 +8639,8 @@
           </a:p>
         </p:txBody>
       </p:sp>
-      <mc:AlternateContent xmlns:mc="http://schemas.openxmlformats.org/markup-compatibility/2006">
-        <mc:Choice xmlns:a14="http://schemas.microsoft.com/office/drawing/2010/main" Requires="a14">
+      <mc:AlternateContent xmlns:mc="http://schemas.openxmlformats.org/markup-compatibility/2006" xmlns:a14="http://schemas.microsoft.com/office/drawing/2010/main">
+        <mc:Choice Requires="a14">
           <p:sp>
             <p:nvSpPr>
               <p:cNvPr id="3" name="Content Placeholder 2">
@@ -9133,7 +9129,7 @@
             </p:txBody>
           </p:sp>
         </mc:Choice>
-        <mc:Fallback>
+        <mc:Fallback xmlns="">
           <p:sp>
             <p:nvSpPr>
               <p:cNvPr id="3" name="Content Placeholder 2">
@@ -9260,8 +9256,8 @@
           </a:p>
         </p:txBody>
       </p:sp>
-      <mc:AlternateContent xmlns:mc="http://schemas.openxmlformats.org/markup-compatibility/2006">
-        <mc:Choice xmlns:a14="http://schemas.microsoft.com/office/drawing/2010/main" Requires="a14">
+      <mc:AlternateContent xmlns:mc="http://schemas.openxmlformats.org/markup-compatibility/2006" xmlns:a14="http://schemas.microsoft.com/office/drawing/2010/main">
+        <mc:Choice Requires="a14">
           <p:sp>
             <p:nvSpPr>
               <p:cNvPr id="3" name="Content Placeholder 2">
@@ -9369,7 +9365,7 @@
             </p:txBody>
           </p:sp>
         </mc:Choice>
-        <mc:Fallback>
+        <mc:Fallback xmlns="">
           <p:sp>
             <p:nvSpPr>
               <p:cNvPr id="3" name="Content Placeholder 2">
@@ -9438,8 +9434,8 @@
           </a:p>
         </p:txBody>
       </p:sp>
-      <mc:AlternateContent xmlns:mc="http://schemas.openxmlformats.org/markup-compatibility/2006">
-        <mc:Choice xmlns:a14="http://schemas.microsoft.com/office/drawing/2010/main" Requires="a14">
+      <mc:AlternateContent xmlns:mc="http://schemas.openxmlformats.org/markup-compatibility/2006" xmlns:a14="http://schemas.microsoft.com/office/drawing/2010/main">
+        <mc:Choice Requires="a14">
           <p:sp>
             <p:nvSpPr>
               <p:cNvPr id="6" name="Rectangle 5">
@@ -9803,7 +9799,7 @@
             </p:txBody>
           </p:sp>
         </mc:Choice>
-        <mc:Fallback>
+        <mc:Fallback xmlns="">
           <p:sp>
             <p:nvSpPr>
               <p:cNvPr id="6" name="Rectangle 5">
@@ -10023,8 +10019,8 @@
           </a:p>
         </p:txBody>
       </p:sp>
-      <mc:AlternateContent xmlns:mc="http://schemas.openxmlformats.org/markup-compatibility/2006">
-        <mc:Choice xmlns:a14="http://schemas.microsoft.com/office/drawing/2010/main" Requires="a14">
+      <mc:AlternateContent xmlns:mc="http://schemas.openxmlformats.org/markup-compatibility/2006" xmlns:a14="http://schemas.microsoft.com/office/drawing/2010/main">
+        <mc:Choice Requires="a14">
           <p:sp>
             <p:nvSpPr>
               <p:cNvPr id="9" name="TextBox 8">
@@ -10084,7 +10080,7 @@
             </p:txBody>
           </p:sp>
         </mc:Choice>
-        <mc:Fallback>
+        <mc:Fallback xmlns="">
           <p:sp>
             <p:nvSpPr>
               <p:cNvPr id="9" name="TextBox 8">
@@ -10129,8 +10125,8 @@
           </p:sp>
         </mc:Fallback>
       </mc:AlternateContent>
-      <mc:AlternateContent xmlns:mc="http://schemas.openxmlformats.org/markup-compatibility/2006">
-        <mc:Choice xmlns:a14="http://schemas.microsoft.com/office/drawing/2010/main" Requires="a14">
+      <mc:AlternateContent xmlns:mc="http://schemas.openxmlformats.org/markup-compatibility/2006" xmlns:a14="http://schemas.microsoft.com/office/drawing/2010/main">
+        <mc:Choice Requires="a14">
           <p:sp>
             <p:nvSpPr>
               <p:cNvPr id="10" name="TextBox 9">
@@ -10190,7 +10186,7 @@
             </p:txBody>
           </p:sp>
         </mc:Choice>
-        <mc:Fallback>
+        <mc:Fallback xmlns="">
           <p:sp>
             <p:nvSpPr>
               <p:cNvPr id="10" name="TextBox 9">
@@ -10235,8 +10231,8 @@
           </p:sp>
         </mc:Fallback>
       </mc:AlternateContent>
-      <mc:AlternateContent xmlns:mc="http://schemas.openxmlformats.org/markup-compatibility/2006">
-        <mc:Choice xmlns:a14="http://schemas.microsoft.com/office/drawing/2010/main" Requires="a14">
+      <mc:AlternateContent xmlns:mc="http://schemas.openxmlformats.org/markup-compatibility/2006" xmlns:a14="http://schemas.microsoft.com/office/drawing/2010/main">
+        <mc:Choice Requires="a14">
           <p:sp>
             <p:nvSpPr>
               <p:cNvPr id="11" name="TextBox 10">
@@ -10288,7 +10284,7 @@
             </p:txBody>
           </p:sp>
         </mc:Choice>
-        <mc:Fallback>
+        <mc:Fallback xmlns="">
           <p:sp>
             <p:nvSpPr>
               <p:cNvPr id="11" name="TextBox 10">
@@ -10393,8 +10389,8 @@
           </a:p>
         </p:txBody>
       </p:sp>
-      <mc:AlternateContent xmlns:mc="http://schemas.openxmlformats.org/markup-compatibility/2006">
-        <mc:Choice xmlns:a14="http://schemas.microsoft.com/office/drawing/2010/main" Requires="a14">
+      <mc:AlternateContent xmlns:mc="http://schemas.openxmlformats.org/markup-compatibility/2006" xmlns:a14="http://schemas.microsoft.com/office/drawing/2010/main">
+        <mc:Choice Requires="a14">
           <p:sp>
             <p:nvSpPr>
               <p:cNvPr id="3" name="Content Placeholder 2">
@@ -10909,7 +10905,7 @@
             </p:txBody>
           </p:sp>
         </mc:Choice>
-        <mc:Fallback>
+        <mc:Fallback xmlns="">
           <p:sp>
             <p:nvSpPr>
               <p:cNvPr id="3" name="Content Placeholder 2">
@@ -11471,8 +11467,8 @@
           </a:p>
         </p:txBody>
       </p:sp>
-      <mc:AlternateContent xmlns:mc="http://schemas.openxmlformats.org/markup-compatibility/2006">
-        <mc:Choice xmlns:a14="http://schemas.microsoft.com/office/drawing/2010/main" Requires="a14">
+      <mc:AlternateContent xmlns:mc="http://schemas.openxmlformats.org/markup-compatibility/2006" xmlns:a14="http://schemas.microsoft.com/office/drawing/2010/main">
+        <mc:Choice Requires="a14">
           <p:sp>
             <p:nvSpPr>
               <p:cNvPr id="3" name="Content Placeholder 2">
@@ -11568,7 +11564,7 @@
             </p:txBody>
           </p:sp>
         </mc:Choice>
-        <mc:Fallback>
+        <mc:Fallback xmlns="">
           <p:sp>
             <p:nvSpPr>
               <p:cNvPr id="3" name="Content Placeholder 2">
@@ -12261,8 +12257,8 @@
           </a:p>
         </p:txBody>
       </p:sp>
-      <mc:AlternateContent xmlns:mc="http://schemas.openxmlformats.org/markup-compatibility/2006">
-        <mc:Choice xmlns:a14="http://schemas.microsoft.com/office/drawing/2010/main" Requires="a14">
+      <mc:AlternateContent xmlns:mc="http://schemas.openxmlformats.org/markup-compatibility/2006" xmlns:a14="http://schemas.microsoft.com/office/drawing/2010/main">
+        <mc:Choice Requires="a14">
           <p:sp>
             <p:nvSpPr>
               <p:cNvPr id="3" name="Content Placeholder 2">
@@ -12358,7 +12354,7 @@
             </p:txBody>
           </p:sp>
         </mc:Choice>
-        <mc:Fallback>
+        <mc:Fallback xmlns="">
           <p:sp>
             <p:nvSpPr>
               <p:cNvPr id="3" name="Content Placeholder 2">
@@ -13027,8 +13023,8 @@
           </a:p>
         </p:txBody>
       </p:sp>
-      <mc:AlternateContent xmlns:mc="http://schemas.openxmlformats.org/markup-compatibility/2006">
-        <mc:Choice xmlns:a14="http://schemas.microsoft.com/office/drawing/2010/main" Requires="a14">
+      <mc:AlternateContent xmlns:mc="http://schemas.openxmlformats.org/markup-compatibility/2006" xmlns:a14="http://schemas.microsoft.com/office/drawing/2010/main">
+        <mc:Choice Requires="a14">
           <p:sp>
             <p:nvSpPr>
               <p:cNvPr id="3" name="Content Placeholder 2"/>
@@ -13090,7 +13086,7 @@
             </p:txBody>
           </p:sp>
         </mc:Choice>
-        <mc:Fallback>
+        <mc:Fallback xmlns="">
           <p:sp>
             <p:nvSpPr>
               <p:cNvPr id="3" name="Content Placeholder 2"/>
@@ -13251,8 +13247,8 @@
           </a:p>
         </p:txBody>
       </p:sp>
-      <mc:AlternateContent xmlns:mc="http://schemas.openxmlformats.org/markup-compatibility/2006">
-        <mc:Choice xmlns:a14="http://schemas.microsoft.com/office/drawing/2010/main" Requires="a14">
+      <mc:AlternateContent xmlns:mc="http://schemas.openxmlformats.org/markup-compatibility/2006" xmlns:a14="http://schemas.microsoft.com/office/drawing/2010/main">
+        <mc:Choice Requires="a14">
           <p:sp>
             <p:nvSpPr>
               <p:cNvPr id="3" name="Content Placeholder 2">
@@ -14235,7 +14231,7 @@
             </p:txBody>
           </p:sp>
         </mc:Choice>
-        <mc:Fallback>
+        <mc:Fallback xmlns="">
           <p:sp>
             <p:nvSpPr>
               <p:cNvPr id="3" name="Content Placeholder 2">
@@ -14362,8 +14358,8 @@
           </a:p>
         </p:txBody>
       </p:sp>
-      <mc:AlternateContent xmlns:mc="http://schemas.openxmlformats.org/markup-compatibility/2006">
-        <mc:Choice xmlns:a14="http://schemas.microsoft.com/office/drawing/2010/main" Requires="a14">
+      <mc:AlternateContent xmlns:mc="http://schemas.openxmlformats.org/markup-compatibility/2006" xmlns:a14="http://schemas.microsoft.com/office/drawing/2010/main">
+        <mc:Choice Requires="a14">
           <p:sp>
             <p:nvSpPr>
               <p:cNvPr id="3" name="Content Placeholder 2">
@@ -15186,7 +15182,7 @@
             </p:txBody>
           </p:sp>
         </mc:Choice>
-        <mc:Fallback>
+        <mc:Fallback xmlns="">
           <p:sp>
             <p:nvSpPr>
               <p:cNvPr id="3" name="Content Placeholder 2">
@@ -15313,8 +15309,8 @@
           </a:p>
         </p:txBody>
       </p:sp>
-      <mc:AlternateContent xmlns:mc="http://schemas.openxmlformats.org/markup-compatibility/2006">
-        <mc:Choice xmlns:a14="http://schemas.microsoft.com/office/drawing/2010/main" Requires="a14">
+      <mc:AlternateContent xmlns:mc="http://schemas.openxmlformats.org/markup-compatibility/2006" xmlns:a14="http://schemas.microsoft.com/office/drawing/2010/main">
+        <mc:Choice Requires="a14">
           <p:sp>
             <p:nvSpPr>
               <p:cNvPr id="3" name="Content Placeholder 2">
@@ -16802,7 +16798,7 @@
             </p:txBody>
           </p:sp>
         </mc:Choice>
-        <mc:Fallback>
+        <mc:Fallback xmlns="">
           <p:sp>
             <p:nvSpPr>
               <p:cNvPr id="3" name="Content Placeholder 2">
@@ -17084,8 +17080,8 @@
           </a:p>
         </p:txBody>
       </p:sp>
-      <mc:AlternateContent xmlns:mc="http://schemas.openxmlformats.org/markup-compatibility/2006">
-        <mc:Choice xmlns:a14="http://schemas.microsoft.com/office/drawing/2010/main" Requires="a14">
+      <mc:AlternateContent xmlns:mc="http://schemas.openxmlformats.org/markup-compatibility/2006" xmlns:a14="http://schemas.microsoft.com/office/drawing/2010/main">
+        <mc:Choice Requires="a14">
           <p:sp>
             <p:nvSpPr>
               <p:cNvPr id="3" name="Content Placeholder 2">
@@ -18871,7 +18867,7 @@
             </p:txBody>
           </p:sp>
         </mc:Choice>
-        <mc:Fallback>
+        <mc:Fallback xmlns="">
           <p:sp>
             <p:nvSpPr>
               <p:cNvPr id="3" name="Content Placeholder 2">
@@ -19381,8 +19377,8 @@
           </a:p>
         </p:txBody>
       </p:sp>
-      <mc:AlternateContent xmlns:mc="http://schemas.openxmlformats.org/markup-compatibility/2006">
-        <mc:Choice xmlns:a14="http://schemas.microsoft.com/office/drawing/2010/main" Requires="a14">
+      <mc:AlternateContent xmlns:mc="http://schemas.openxmlformats.org/markup-compatibility/2006" xmlns:a14="http://schemas.microsoft.com/office/drawing/2010/main">
+        <mc:Choice Requires="a14">
           <p:sp>
             <p:nvSpPr>
               <p:cNvPr id="3" name="Content Placeholder 2">
@@ -19762,7 +19758,7 @@
             </p:txBody>
           </p:sp>
         </mc:Choice>
-        <mc:Fallback>
+        <mc:Fallback xmlns="">
           <p:sp>
             <p:nvSpPr>
               <p:cNvPr id="3" name="Content Placeholder 2">
@@ -20265,8 +20261,8 @@
           </a:p>
         </p:txBody>
       </p:sp>
-      <mc:AlternateContent xmlns:mc="http://schemas.openxmlformats.org/markup-compatibility/2006">
-        <mc:Choice xmlns:a14="http://schemas.microsoft.com/office/drawing/2010/main" Requires="a14">
+      <mc:AlternateContent xmlns:mc="http://schemas.openxmlformats.org/markup-compatibility/2006" xmlns:a14="http://schemas.microsoft.com/office/drawing/2010/main">
+        <mc:Choice Requires="a14">
           <p:sp>
             <p:nvSpPr>
               <p:cNvPr id="3" name="Content Placeholder 2">
@@ -20354,7 +20350,7 @@
             </p:txBody>
           </p:sp>
         </mc:Choice>
-        <mc:Fallback>
+        <mc:Fallback xmlns="">
           <p:sp>
             <p:nvSpPr>
               <p:cNvPr id="3" name="Content Placeholder 2">
@@ -21233,6 +21229,377 @@
       </p:grpSpPr>
       <p:sp>
         <p:nvSpPr>
+          <p:cNvPr id="2" name="Title 1">
+            <a:extLst>
+              <a:ext uri="{FF2B5EF4-FFF2-40B4-BE49-F238E27FC236}">
+                <a16:creationId xmlns:a16="http://schemas.microsoft.com/office/drawing/2014/main" id="{DA698F92-4035-E84F-80C7-61E9AA4CE884}"/>
+              </a:ext>
+            </a:extLst>
+          </p:cNvPr>
+          <p:cNvSpPr>
+            <a:spLocks noGrp="1"/>
+          </p:cNvSpPr>
+          <p:nvPr>
+            <p:ph type="title"/>
+          </p:nvPr>
+        </p:nvSpPr>
+        <p:spPr/>
+        <p:txBody>
+          <a:bodyPr/>
+          <a:lstStyle/>
+          <a:p>
+            <a:r>
+              <a:rPr lang="en-US" dirty="0"/>
+              <a:t>More about cross validation</a:t>
+            </a:r>
+          </a:p>
+        </p:txBody>
+      </p:sp>
+      <p:sp>
+        <p:nvSpPr>
+          <p:cNvPr id="3" name="Content Placeholder 2">
+            <a:extLst>
+              <a:ext uri="{FF2B5EF4-FFF2-40B4-BE49-F238E27FC236}">
+                <a16:creationId xmlns:a16="http://schemas.microsoft.com/office/drawing/2014/main" id="{9B6EF519-0245-0C48-B0FA-6AA1E1E1305B}"/>
+              </a:ext>
+            </a:extLst>
+          </p:cNvPr>
+          <p:cNvSpPr>
+            <a:spLocks noGrp="1"/>
+          </p:cNvSpPr>
+          <p:nvPr>
+            <p:ph idx="1"/>
+          </p:nvPr>
+        </p:nvSpPr>
+        <p:spPr/>
+        <p:txBody>
+          <a:bodyPr>
+            <a:normAutofit lnSpcReduction="10000"/>
+          </a:bodyPr>
+          <a:lstStyle/>
+          <a:p>
+            <a:r>
+              <a:rPr lang="en-US" dirty="0"/>
+              <a:t>Why do we use cross validation?</a:t>
+            </a:r>
+          </a:p>
+          <a:p>
+            <a:pPr lvl="1"/>
+            <a:r>
+              <a:rPr lang="en-US" dirty="0"/>
+              <a:t>To estimate the test error when there are insufficient training data so that we can partition the total data to a </a:t>
+            </a:r>
+            <a:r>
+              <a:rPr lang="en-US" b="1" dirty="0"/>
+              <a:t>large</a:t>
+            </a:r>
+            <a:r>
+              <a:rPr lang="en-US" dirty="0"/>
+              <a:t> training set and a </a:t>
+            </a:r>
+            <a:r>
+              <a:rPr lang="en-US" b="1" dirty="0"/>
+              <a:t>large</a:t>
+            </a:r>
+            <a:r>
+              <a:rPr lang="en-US" dirty="0"/>
+              <a:t> test set. </a:t>
+            </a:r>
+          </a:p>
+          <a:p>
+            <a:pPr lvl="1"/>
+            <a:r>
+              <a:rPr lang="en-US" dirty="0"/>
+              <a:t>Whether a dataset is large depends on the number of parameters of the model to be trained. </a:t>
+            </a:r>
+          </a:p>
+          <a:p>
+            <a:pPr lvl="1"/>
+            <a:r>
+              <a:rPr lang="en-US" dirty="0"/>
+              <a:t>Ideally the number of samples should be  &gt;100x  of the number of parameters, but at least 10x.</a:t>
+            </a:r>
+          </a:p>
+          <a:p>
+            <a:r>
+              <a:rPr lang="en-US" dirty="0"/>
+              <a:t>When you have sufficient training data, you can just use a certain percentage (e.g. 50%) for training and remaining for testing. The error on the testing set would be a reliable estimate of the test error.</a:t>
+            </a:r>
+          </a:p>
+          <a:p>
+            <a:r>
+              <a:rPr lang="en-US" dirty="0"/>
+              <a:t>Two ways of using cross validation</a:t>
+            </a:r>
+          </a:p>
+          <a:p>
+            <a:pPr lvl="1"/>
+            <a:r>
+              <a:rPr lang="en-US" dirty="0"/>
+              <a:t>When the “best” model class, model order, and feature set are known: </a:t>
+            </a:r>
+          </a:p>
+          <a:p>
+            <a:pPr lvl="2"/>
+            <a:r>
+              <a:rPr lang="en-US" dirty="0"/>
+              <a:t>Use CV to estimate the test error</a:t>
+            </a:r>
+          </a:p>
+          <a:p>
+            <a:pPr lvl="1"/>
+            <a:r>
+              <a:rPr lang="en-US" dirty="0"/>
+              <a:t>Use CV to determine the appropriate model class, model order and feature subset</a:t>
+            </a:r>
+          </a:p>
+          <a:p>
+            <a:pPr lvl="2"/>
+            <a:r>
+              <a:rPr lang="en-US" dirty="0"/>
+              <a:t>For each candidate model class, model order, and feature subset, evaluate CV error</a:t>
+            </a:r>
+          </a:p>
+          <a:p>
+            <a:pPr lvl="2"/>
+            <a:r>
+              <a:rPr lang="en-US" dirty="0"/>
+              <a:t>Determine which candidate yields the least CV error.</a:t>
+            </a:r>
+          </a:p>
+          <a:p>
+            <a:pPr lvl="1"/>
+            <a:endParaRPr lang="en-US" dirty="0"/>
+          </a:p>
+          <a:p>
+            <a:pPr lvl="1"/>
+            <a:endParaRPr lang="en-US" dirty="0"/>
+          </a:p>
+        </p:txBody>
+      </p:sp>
+      <p:sp>
+        <p:nvSpPr>
+          <p:cNvPr id="4" name="Slide Number Placeholder 3">
+            <a:extLst>
+              <a:ext uri="{FF2B5EF4-FFF2-40B4-BE49-F238E27FC236}">
+                <a16:creationId xmlns:a16="http://schemas.microsoft.com/office/drawing/2014/main" id="{C4C446C5-42C4-2941-BA2B-D37926D53F27}"/>
+              </a:ext>
+            </a:extLst>
+          </p:cNvPr>
+          <p:cNvSpPr>
+            <a:spLocks noGrp="1"/>
+          </p:cNvSpPr>
+          <p:nvPr>
+            <p:ph type="sldNum" sz="quarter" idx="12"/>
+          </p:nvPr>
+        </p:nvSpPr>
+        <p:spPr/>
+        <p:txBody>
+          <a:bodyPr/>
+          <a:lstStyle/>
+          <a:p>
+            <a:fld id="{629637A9-119A-49DA-BD12-AAC58B377D80}" type="slidenum">
+              <a:rPr lang="en-US" smtClean="0"/>
+              <a:t>40</a:t>
+            </a:fld>
+            <a:endParaRPr lang="en-US" dirty="0"/>
+          </a:p>
+        </p:txBody>
+      </p:sp>
+    </p:spTree>
+    <p:extLst>
+      <p:ext uri="{BB962C8B-B14F-4D97-AF65-F5344CB8AC3E}">
+        <p14:creationId xmlns:p14="http://schemas.microsoft.com/office/powerpoint/2010/main" val="184803291"/>
+      </p:ext>
+    </p:extLst>
+  </p:cSld>
+  <p:clrMapOvr>
+    <a:masterClrMapping/>
+  </p:clrMapOvr>
+</p:sld>
+</file>
+
+<file path=ppt/slides/slide41.xml><?xml version="1.0" encoding="utf-8"?>
+<p:sld xmlns:a="http://schemas.openxmlformats.org/drawingml/2006/main" xmlns:r="http://schemas.openxmlformats.org/officeDocument/2006/relationships" xmlns:p="http://schemas.openxmlformats.org/presentationml/2006/main">
+  <p:cSld>
+    <p:spTree>
+      <p:nvGrpSpPr>
+        <p:cNvPr id="1" name=""/>
+        <p:cNvGrpSpPr/>
+        <p:nvPr/>
+      </p:nvGrpSpPr>
+      <p:grpSpPr>
+        <a:xfrm>
+          <a:off x="0" y="0"/>
+          <a:ext cx="0" cy="0"/>
+          <a:chOff x="0" y="0"/>
+          <a:chExt cx="0" cy="0"/>
+        </a:xfrm>
+      </p:grpSpPr>
+      <p:sp>
+        <p:nvSpPr>
+          <p:cNvPr id="2" name="Title 1">
+            <a:extLst>
+              <a:ext uri="{FF2B5EF4-FFF2-40B4-BE49-F238E27FC236}">
+                <a16:creationId xmlns:a16="http://schemas.microsoft.com/office/drawing/2014/main" id="{8DD8533F-2B44-624C-BE8E-164A44AFB9FD}"/>
+              </a:ext>
+            </a:extLst>
+          </p:cNvPr>
+          <p:cNvSpPr>
+            <a:spLocks noGrp="1"/>
+          </p:cNvSpPr>
+          <p:nvPr>
+            <p:ph type="title"/>
+          </p:nvPr>
+        </p:nvSpPr>
+        <p:spPr/>
+        <p:txBody>
+          <a:bodyPr/>
+          <a:lstStyle/>
+          <a:p>
+            <a:r>
+              <a:rPr lang="en-US" dirty="0"/>
+              <a:t>More about cross validation</a:t>
+            </a:r>
+          </a:p>
+        </p:txBody>
+      </p:sp>
+      <p:sp>
+        <p:nvSpPr>
+          <p:cNvPr id="3" name="Content Placeholder 2">
+            <a:extLst>
+              <a:ext uri="{FF2B5EF4-FFF2-40B4-BE49-F238E27FC236}">
+                <a16:creationId xmlns:a16="http://schemas.microsoft.com/office/drawing/2014/main" id="{64879B8A-F7A0-0742-BB5E-5DD0A5DDAEC5}"/>
+              </a:ext>
+            </a:extLst>
+          </p:cNvPr>
+          <p:cNvSpPr>
+            <a:spLocks noGrp="1"/>
+          </p:cNvSpPr>
+          <p:nvPr>
+            <p:ph idx="1"/>
+          </p:nvPr>
+        </p:nvSpPr>
+        <p:spPr/>
+        <p:txBody>
+          <a:bodyPr/>
+          <a:lstStyle/>
+          <a:p>
+            <a:r>
+              <a:rPr lang="en-US" dirty="0"/>
+              <a:t>How to use the multiple estimated models from multiple trials?</a:t>
+            </a:r>
+          </a:p>
+          <a:p>
+            <a:pPr lvl="1"/>
+            <a:r>
+              <a:rPr lang="en-US" dirty="0"/>
+              <a:t>Apply each on a test sample and take the average (for regression) or majority (for classification) of results</a:t>
+            </a:r>
+          </a:p>
+          <a:p>
+            <a:pPr lvl="1"/>
+            <a:r>
+              <a:rPr lang="en-US" dirty="0"/>
+              <a:t>For linear regression, equivalent to average the model coefficients</a:t>
+            </a:r>
+          </a:p>
+          <a:p>
+            <a:r>
+              <a:rPr lang="en-US" dirty="0"/>
+              <a:t>When your data is limited, you may want to go beyond K-folds	</a:t>
+            </a:r>
+          </a:p>
+          <a:p>
+            <a:pPr lvl="1"/>
+            <a:r>
+              <a:rPr lang="en-US" dirty="0"/>
+              <a:t>Ex: 5-fold means that you partition the data to 5 parts in some way, each part has 20% of data, and only do 5 fold training and testing</a:t>
+            </a:r>
+          </a:p>
+          <a:p>
+            <a:pPr lvl="1"/>
+            <a:r>
+              <a:rPr lang="en-US" dirty="0"/>
+              <a:t>When your data is small, the average CV error is still very sensitive to how the data is partitioned to 5 parts. If you use random shuffling, you will get different result each time.</a:t>
+            </a:r>
+          </a:p>
+          <a:p>
+            <a:pPr lvl="1"/>
+            <a:r>
+              <a:rPr lang="en-US" dirty="0"/>
+              <a:t>Instead, you could do L trials (L&gt;&gt;5) of random sampling, each time using 80% for training and 20% for testing </a:t>
+            </a:r>
+          </a:p>
+          <a:p>
+            <a:r>
+              <a:rPr lang="en-US" dirty="0"/>
+              <a:t>How to handle limited data in machine learning is still a challenging topic!</a:t>
+            </a:r>
+          </a:p>
+        </p:txBody>
+      </p:sp>
+      <p:sp>
+        <p:nvSpPr>
+          <p:cNvPr id="4" name="Slide Number Placeholder 3">
+            <a:extLst>
+              <a:ext uri="{FF2B5EF4-FFF2-40B4-BE49-F238E27FC236}">
+                <a16:creationId xmlns:a16="http://schemas.microsoft.com/office/drawing/2014/main" id="{5885FC27-C991-E24B-8D32-7D179D987505}"/>
+              </a:ext>
+            </a:extLst>
+          </p:cNvPr>
+          <p:cNvSpPr>
+            <a:spLocks noGrp="1"/>
+          </p:cNvSpPr>
+          <p:nvPr>
+            <p:ph type="sldNum" sz="quarter" idx="12"/>
+          </p:nvPr>
+        </p:nvSpPr>
+        <p:spPr/>
+        <p:txBody>
+          <a:bodyPr/>
+          <a:lstStyle/>
+          <a:p>
+            <a:fld id="{629637A9-119A-49DA-BD12-AAC58B377D80}" type="slidenum">
+              <a:rPr lang="en-US" smtClean="0"/>
+              <a:t>41</a:t>
+            </a:fld>
+            <a:endParaRPr lang="en-US" dirty="0"/>
+          </a:p>
+        </p:txBody>
+      </p:sp>
+    </p:spTree>
+    <p:extLst>
+      <p:ext uri="{BB962C8B-B14F-4D97-AF65-F5344CB8AC3E}">
+        <p14:creationId xmlns:p14="http://schemas.microsoft.com/office/powerpoint/2010/main" val="2106499445"/>
+      </p:ext>
+    </p:extLst>
+  </p:cSld>
+  <p:clrMapOvr>
+    <a:masterClrMapping/>
+  </p:clrMapOvr>
+</p:sld>
+</file>
+
+<file path=ppt/slides/slide42.xml><?xml version="1.0" encoding="utf-8"?>
+<p:sld xmlns:a="http://schemas.openxmlformats.org/drawingml/2006/main" xmlns:r="http://schemas.openxmlformats.org/officeDocument/2006/relationships" xmlns:p="http://schemas.openxmlformats.org/presentationml/2006/main">
+  <p:cSld>
+    <p:spTree>
+      <p:nvGrpSpPr>
+        <p:cNvPr id="1" name=""/>
+        <p:cNvGrpSpPr/>
+        <p:nvPr/>
+      </p:nvGrpSpPr>
+      <p:grpSpPr>
+        <a:xfrm>
+          <a:off x="0" y="0"/>
+          <a:ext cx="0" cy="0"/>
+          <a:chOff x="0" y="0"/>
+          <a:chExt cx="0" cy="0"/>
+        </a:xfrm>
+      </p:grpSpPr>
+      <p:sp>
+        <p:nvSpPr>
           <p:cNvPr id="2" name="Title 1"/>
           <p:cNvSpPr>
             <a:spLocks noGrp="1"/>
@@ -21310,13 +21677,19 @@
             </a:r>
             <a:r>
               <a:rPr lang="en-US" dirty="0"/>
-              <a:t> based on a probabilistic prior</a:t>
+              <a:t> based on a probabilistic prior and understand the difference between Ridge and LASSO regression</a:t>
             </a:r>
           </a:p>
           <a:p>
             <a:r>
               <a:rPr lang="en-US" dirty="0"/>
-              <a:t>Different feature selection methods</a:t>
+              <a:t>Different feature selection methods and their pros and cons</a:t>
+            </a:r>
+          </a:p>
+          <a:p>
+            <a:r>
+              <a:rPr lang="en-US" dirty="0"/>
+              <a:t>How and when to use cross validation </a:t>
             </a:r>
           </a:p>
           <a:p>
@@ -21359,7 +21732,7 @@
           <a:p>
             <a:fld id="{629637A9-119A-49DA-BD12-AAC58B377D80}" type="slidenum">
               <a:rPr lang="en-US" smtClean="0"/>
-              <a:t>40</a:t>
+              <a:t>42</a:t>
             </a:fld>
             <a:endParaRPr lang="en-US" dirty="0"/>
           </a:p>

</xml_diff>

<commit_message>
Added noise to the in-class data set.
</commit_message>
<xml_diff>
--- a/lectures/Lect05_Lasso.pptx
+++ b/lectures/Lect05_Lasso.pptx
@@ -5,7 +5,7 @@
     <p:sldMasterId id="2147483648" r:id="rId1"/>
   </p:sldMasterIdLst>
   <p:notesMasterIdLst>
-    <p:notesMasterId r:id="rId52"/>
+    <p:notesMasterId r:id="rId54"/>
   </p:notesMasterIdLst>
   <p:sldIdLst>
     <p:sldId id="258" r:id="rId2"/>
@@ -16,14 +16,14 @@
     <p:sldId id="360" r:id="rId7"/>
     <p:sldId id="361" r:id="rId8"/>
     <p:sldId id="399" r:id="rId9"/>
-    <p:sldId id="407" r:id="rId10"/>
+    <p:sldId id="413" r:id="rId10"/>
     <p:sldId id="400" r:id="rId11"/>
     <p:sldId id="402" r:id="rId12"/>
     <p:sldId id="404" r:id="rId13"/>
     <p:sldId id="265" r:id="rId14"/>
     <p:sldId id="403" r:id="rId15"/>
     <p:sldId id="411" r:id="rId16"/>
-    <p:sldId id="408" r:id="rId17"/>
+    <p:sldId id="414" r:id="rId17"/>
     <p:sldId id="364" r:id="rId18"/>
     <p:sldId id="363" r:id="rId19"/>
     <p:sldId id="365" r:id="rId20"/>
@@ -40,12 +40,12 @@
     <p:sldId id="371" r:id="rId31"/>
     <p:sldId id="372" r:id="rId32"/>
     <p:sldId id="393" r:id="rId33"/>
-    <p:sldId id="409" r:id="rId34"/>
+    <p:sldId id="415" r:id="rId34"/>
     <p:sldId id="386" r:id="rId35"/>
     <p:sldId id="373" r:id="rId36"/>
     <p:sldId id="374" r:id="rId37"/>
     <p:sldId id="385" r:id="rId38"/>
-    <p:sldId id="410" r:id="rId39"/>
+    <p:sldId id="416" r:id="rId39"/>
     <p:sldId id="381" r:id="rId40"/>
     <p:sldId id="382" r:id="rId41"/>
     <p:sldId id="396" r:id="rId42"/>
@@ -57,7 +57,9 @@
     <p:sldId id="392" r:id="rId48"/>
     <p:sldId id="397" r:id="rId49"/>
     <p:sldId id="398" r:id="rId50"/>
-    <p:sldId id="412" r:id="rId51"/>
+    <p:sldId id="417" r:id="rId51"/>
+    <p:sldId id="418" r:id="rId52"/>
+    <p:sldId id="412" r:id="rId53"/>
   </p:sldIdLst>
   <p:sldSz cx="12192000" cy="6858000"/>
   <p:notesSz cx="7315200" cy="9601200"/>
@@ -850,7 +852,7 @@
     </p:spTree>
     <p:extLst>
       <p:ext uri="{BB962C8B-B14F-4D97-AF65-F5344CB8AC3E}">
-        <p14:creationId xmlns:p14="http://schemas.microsoft.com/office/powerpoint/2010/main" val="1543703961"/>
+        <p14:creationId xmlns:p14="http://schemas.microsoft.com/office/powerpoint/2010/main" val="3468404257"/>
       </p:ext>
     </p:extLst>
   </p:cSld>
@@ -934,7 +936,7 @@
     </p:spTree>
     <p:extLst>
       <p:ext uri="{BB962C8B-B14F-4D97-AF65-F5344CB8AC3E}">
-        <p14:creationId xmlns:p14="http://schemas.microsoft.com/office/powerpoint/2010/main" val="3011440800"/>
+        <p14:creationId xmlns:p14="http://schemas.microsoft.com/office/powerpoint/2010/main" val="851207911"/>
       </p:ext>
     </p:extLst>
   </p:cSld>
@@ -1018,7 +1020,7 @@
     </p:spTree>
     <p:extLst>
       <p:ext uri="{BB962C8B-B14F-4D97-AF65-F5344CB8AC3E}">
-        <p14:creationId xmlns:p14="http://schemas.microsoft.com/office/powerpoint/2010/main" val="330250365"/>
+        <p14:creationId xmlns:p14="http://schemas.microsoft.com/office/powerpoint/2010/main" val="4042024219"/>
       </p:ext>
     </p:extLst>
   </p:cSld>
@@ -1102,7 +1104,7 @@
     </p:spTree>
     <p:extLst>
       <p:ext uri="{BB962C8B-B14F-4D97-AF65-F5344CB8AC3E}">
-        <p14:creationId xmlns:p14="http://schemas.microsoft.com/office/powerpoint/2010/main" val="500171684"/>
+        <p14:creationId xmlns:p14="http://schemas.microsoft.com/office/powerpoint/2010/main" val="285560295"/>
       </p:ext>
     </p:extLst>
   </p:cSld>
@@ -1178,6 +1180,90 @@
             <a:fld id="{65CF6084-2C3C-4FE7-B181-D16A3429058A}" type="slidenum">
               <a:rPr lang="en-US" smtClean="0"/>
               <a:t>50</a:t>
+            </a:fld>
+            <a:endParaRPr lang="en-US"/>
+          </a:p>
+        </p:txBody>
+      </p:sp>
+    </p:spTree>
+    <p:extLst>
+      <p:ext uri="{BB962C8B-B14F-4D97-AF65-F5344CB8AC3E}">
+        <p14:creationId xmlns:p14="http://schemas.microsoft.com/office/powerpoint/2010/main" val="3912979529"/>
+      </p:ext>
+    </p:extLst>
+  </p:cSld>
+  <p:clrMapOvr>
+    <a:masterClrMapping/>
+  </p:clrMapOvr>
+</p:notes>
+</file>
+
+<file path=ppt/notesSlides/notesSlide9.xml><?xml version="1.0" encoding="utf-8"?>
+<p:notes xmlns:a="http://schemas.openxmlformats.org/drawingml/2006/main" xmlns:r="http://schemas.openxmlformats.org/officeDocument/2006/relationships" xmlns:p="http://schemas.openxmlformats.org/presentationml/2006/main">
+  <p:cSld>
+    <p:spTree>
+      <p:nvGrpSpPr>
+        <p:cNvPr id="1" name=""/>
+        <p:cNvGrpSpPr/>
+        <p:nvPr/>
+      </p:nvGrpSpPr>
+      <p:grpSpPr>
+        <a:xfrm>
+          <a:off x="0" y="0"/>
+          <a:ext cx="0" cy="0"/>
+          <a:chOff x="0" y="0"/>
+          <a:chExt cx="0" cy="0"/>
+        </a:xfrm>
+      </p:grpSpPr>
+      <p:sp>
+        <p:nvSpPr>
+          <p:cNvPr id="2" name="Slide Image Placeholder 1"/>
+          <p:cNvSpPr>
+            <a:spLocks noGrp="1" noRot="1" noChangeAspect="1"/>
+          </p:cNvSpPr>
+          <p:nvPr>
+            <p:ph type="sldImg"/>
+          </p:nvPr>
+        </p:nvSpPr>
+        <p:spPr/>
+      </p:sp>
+      <p:sp>
+        <p:nvSpPr>
+          <p:cNvPr id="3" name="Notes Placeholder 2"/>
+          <p:cNvSpPr>
+            <a:spLocks noGrp="1"/>
+          </p:cNvSpPr>
+          <p:nvPr>
+            <p:ph type="body" idx="1"/>
+          </p:nvPr>
+        </p:nvSpPr>
+        <p:spPr/>
+        <p:txBody>
+          <a:bodyPr/>
+          <a:lstStyle/>
+          <a:p>
+            <a:endParaRPr lang="en-US"/>
+          </a:p>
+        </p:txBody>
+      </p:sp>
+      <p:sp>
+        <p:nvSpPr>
+          <p:cNvPr id="4" name="Slide Number Placeholder 3"/>
+          <p:cNvSpPr>
+            <a:spLocks noGrp="1"/>
+          </p:cNvSpPr>
+          <p:nvPr>
+            <p:ph type="sldNum" sz="quarter" idx="10"/>
+          </p:nvPr>
+        </p:nvSpPr>
+        <p:spPr/>
+        <p:txBody>
+          <a:bodyPr/>
+          <a:lstStyle/>
+          <a:p>
+            <a:fld id="{65CF6084-2C3C-4FE7-B181-D16A3429058A}" type="slidenum">
+              <a:rPr lang="en-US" smtClean="0"/>
+              <a:t>52</a:t>
             </a:fld>
             <a:endParaRPr lang="en-US"/>
           </a:p>
@@ -4862,8 +4948,8 @@
           </a:p>
         </p:txBody>
       </p:sp>
-      <mc:AlternateContent xmlns:mc="http://schemas.openxmlformats.org/markup-compatibility/2006">
-        <mc:Choice xmlns:a14="http://schemas.microsoft.com/office/drawing/2010/main" Requires="a14">
+      <mc:AlternateContent xmlns:mc="http://schemas.openxmlformats.org/markup-compatibility/2006" xmlns:a14="http://schemas.microsoft.com/office/drawing/2010/main">
+        <mc:Choice Requires="a14">
           <p:sp>
             <p:nvSpPr>
               <p:cNvPr id="3" name="Content Placeholder 2">
@@ -5504,7 +5590,7 @@
             </p:txBody>
           </p:sp>
         </mc:Choice>
-        <mc:Fallback>
+        <mc:Fallback xmlns="">
           <p:sp>
             <p:nvSpPr>
               <p:cNvPr id="3" name="Content Placeholder 2">
@@ -5804,8 +5890,8 @@
           </a:p>
         </p:txBody>
       </p:sp>
-      <mc:AlternateContent xmlns:mc="http://schemas.openxmlformats.org/markup-compatibility/2006">
-        <mc:Choice xmlns:a14="http://schemas.microsoft.com/office/drawing/2010/main" Requires="a14">
+      <mc:AlternateContent xmlns:mc="http://schemas.openxmlformats.org/markup-compatibility/2006" xmlns:a14="http://schemas.microsoft.com/office/drawing/2010/main">
+        <mc:Choice Requires="a14">
           <p:sp>
             <p:nvSpPr>
               <p:cNvPr id="3" name="Content Placeholder 2">
@@ -6235,7 +6321,7 @@
             </p:txBody>
           </p:sp>
         </mc:Choice>
-        <mc:Fallback>
+        <mc:Fallback xmlns="">
           <p:sp>
             <p:nvSpPr>
               <p:cNvPr id="3" name="Content Placeholder 2">
@@ -6356,8 +6442,8 @@
           </a:p>
         </p:txBody>
       </p:sp>
-      <mc:AlternateContent xmlns:mc="http://schemas.openxmlformats.org/markup-compatibility/2006">
-        <mc:Choice xmlns:a14="http://schemas.microsoft.com/office/drawing/2010/main" Requires="a14">
+      <mc:AlternateContent xmlns:mc="http://schemas.openxmlformats.org/markup-compatibility/2006" xmlns:a14="http://schemas.microsoft.com/office/drawing/2010/main">
+        <mc:Choice Requires="a14">
           <p:sp>
             <p:nvSpPr>
               <p:cNvPr id="3" name="Content Placeholder 2"/>
@@ -6566,7 +6652,7 @@
             </p:txBody>
           </p:sp>
         </mc:Choice>
-        <mc:Fallback>
+        <mc:Fallback xmlns="">
           <p:sp>
             <p:nvSpPr>
               <p:cNvPr id="3" name="Content Placeholder 2"/>
@@ -6709,8 +6795,8 @@
           </a:p>
         </p:txBody>
       </p:sp>
-      <mc:AlternateContent xmlns:mc="http://schemas.openxmlformats.org/markup-compatibility/2006">
-        <mc:Choice xmlns:a14="http://schemas.microsoft.com/office/drawing/2010/main" Requires="a14">
+      <mc:AlternateContent xmlns:mc="http://schemas.openxmlformats.org/markup-compatibility/2006" xmlns:a14="http://schemas.microsoft.com/office/drawing/2010/main">
+        <mc:Choice Requires="a14">
           <p:sp>
             <p:nvSpPr>
               <p:cNvPr id="3" name="Content Placeholder 2">
@@ -6848,7 +6934,7 @@
             </p:txBody>
           </p:sp>
         </mc:Choice>
-        <mc:Fallback>
+        <mc:Fallback xmlns="">
           <p:sp>
             <p:nvSpPr>
               <p:cNvPr id="3" name="Content Placeholder 2">
@@ -7112,8 +7198,8 @@
           </a:p>
         </p:txBody>
       </p:sp>
-      <mc:AlternateContent xmlns:mc="http://schemas.openxmlformats.org/markup-compatibility/2006">
-        <mc:Choice xmlns:a14="http://schemas.microsoft.com/office/drawing/2010/main" Requires="a14">
+      <mc:AlternateContent xmlns:mc="http://schemas.openxmlformats.org/markup-compatibility/2006" xmlns:a14="http://schemas.microsoft.com/office/drawing/2010/main">
+        <mc:Choice Requires="a14">
           <p:sp>
             <p:nvSpPr>
               <p:cNvPr id="3" name="Content Placeholder 2">
@@ -7276,7 +7362,7 @@
             </p:txBody>
           </p:sp>
         </mc:Choice>
-        <mc:Fallback>
+        <mc:Fallback xmlns="">
           <p:sp>
             <p:nvSpPr>
               <p:cNvPr id="3" name="Content Placeholder 2">
@@ -7468,7 +7554,13 @@
           <a:p>
             <a:r>
               <a:rPr lang="en-US" dirty="0"/>
-              <a:t>Other Model Selection Methods </a:t>
+              <a:t>Other Model Selection Methods</a:t>
+            </a:r>
+          </a:p>
+          <a:p>
+            <a:r>
+              <a:rPr lang="en-US" dirty="0"/>
+              <a:t>In-Class Exercise:  Audio Pitch Detection </a:t>
             </a:r>
           </a:p>
         </p:txBody>
@@ -7504,7 +7596,7 @@
         </p:nvSpPr>
         <p:spPr>
           <a:xfrm>
-            <a:off x="314049" y="2331977"/>
+            <a:off x="277473" y="2356361"/>
             <a:ext cx="978408" cy="484632"/>
           </a:xfrm>
           <a:prstGeom prst="rightArrow">
@@ -7545,7 +7637,7 @@
     </p:spTree>
     <p:extLst>
       <p:ext uri="{BB962C8B-B14F-4D97-AF65-F5344CB8AC3E}">
-        <p14:creationId xmlns:p14="http://schemas.microsoft.com/office/powerpoint/2010/main" val="3638507278"/>
+        <p14:creationId xmlns:p14="http://schemas.microsoft.com/office/powerpoint/2010/main" val="3026055136"/>
       </p:ext>
     </p:extLst>
   </p:cSld>
@@ -8751,8 +8843,8 @@
           </a:p>
         </p:txBody>
       </p:sp>
-      <mc:AlternateContent xmlns:mc="http://schemas.openxmlformats.org/markup-compatibility/2006">
-        <mc:Choice xmlns:a14="http://schemas.microsoft.com/office/drawing/2010/main" Requires="a14">
+      <mc:AlternateContent xmlns:mc="http://schemas.openxmlformats.org/markup-compatibility/2006" xmlns:a14="http://schemas.microsoft.com/office/drawing/2010/main">
+        <mc:Choice Requires="a14">
           <p:sp>
             <p:nvSpPr>
               <p:cNvPr id="3" name="Content Placeholder 2">
@@ -9202,7 +9294,7 @@
             </p:txBody>
           </p:sp>
         </mc:Choice>
-        <mc:Fallback>
+        <mc:Fallback xmlns="">
           <p:sp>
             <p:nvSpPr>
               <p:cNvPr id="3" name="Content Placeholder 2">
@@ -9732,8 +9824,8 @@
           </mc:Fallback>
         </mc:AlternateContent>
       </p:grpSp>
-      <mc:AlternateContent xmlns:mc="http://schemas.openxmlformats.org/markup-compatibility/2006">
-        <mc:Choice xmlns:a14="http://schemas.microsoft.com/office/drawing/2010/main" Requires="a14">
+      <mc:AlternateContent xmlns:mc="http://schemas.openxmlformats.org/markup-compatibility/2006" xmlns:a14="http://schemas.microsoft.com/office/drawing/2010/main">
+        <mc:Choice Requires="a14">
           <p:sp>
             <p:nvSpPr>
               <p:cNvPr id="9" name="TextBox 8">
@@ -9903,7 +9995,7 @@
             </p:txBody>
           </p:sp>
         </mc:Choice>
-        <mc:Fallback>
+        <mc:Fallback xmlns="">
           <p:sp>
             <p:nvSpPr>
               <p:cNvPr id="9" name="TextBox 8">
@@ -10176,8 +10268,8 @@
           </a:p>
         </p:txBody>
       </p:sp>
-      <mc:AlternateContent xmlns:mc="http://schemas.openxmlformats.org/markup-compatibility/2006">
-        <mc:Choice xmlns:a14="http://schemas.microsoft.com/office/drawing/2010/main" Requires="a14">
+      <mc:AlternateContent xmlns:mc="http://schemas.openxmlformats.org/markup-compatibility/2006" xmlns:a14="http://schemas.microsoft.com/office/drawing/2010/main">
+        <mc:Choice Requires="a14">
           <p:sp>
             <p:nvSpPr>
               <p:cNvPr id="3" name="Content Placeholder 2">
@@ -10706,7 +10798,7 @@
             </p:txBody>
           </p:sp>
         </mc:Choice>
-        <mc:Fallback>
+        <mc:Fallback xmlns="">
           <p:sp>
             <p:nvSpPr>
               <p:cNvPr id="3" name="Content Placeholder 2">
@@ -12063,8 +12155,8 @@
           </a:p>
         </p:txBody>
       </p:sp>
-      <mc:AlternateContent xmlns:mc="http://schemas.openxmlformats.org/markup-compatibility/2006">
-        <mc:Choice xmlns:a14="http://schemas.microsoft.com/office/drawing/2010/main" Requires="a14">
+      <mc:AlternateContent xmlns:mc="http://schemas.openxmlformats.org/markup-compatibility/2006" xmlns:a14="http://schemas.microsoft.com/office/drawing/2010/main">
+        <mc:Choice Requires="a14">
           <p:sp>
             <p:nvSpPr>
               <p:cNvPr id="3" name="Content Placeholder 2">
@@ -12588,7 +12680,7 @@
             </p:txBody>
           </p:sp>
         </mc:Choice>
-        <mc:Fallback>
+        <mc:Fallback xmlns="">
           <p:sp>
             <p:nvSpPr>
               <p:cNvPr id="3" name="Content Placeholder 2">
@@ -15044,8 +15136,8 @@
           </a:p>
         </p:txBody>
       </p:sp>
-      <mc:AlternateContent xmlns:mc="http://schemas.openxmlformats.org/markup-compatibility/2006">
-        <mc:Choice xmlns:a14="http://schemas.microsoft.com/office/drawing/2010/main" Requires="a14">
+      <mc:AlternateContent xmlns:mc="http://schemas.openxmlformats.org/markup-compatibility/2006" xmlns:a14="http://schemas.microsoft.com/office/drawing/2010/main">
+        <mc:Choice Requires="a14">
           <p:sp>
             <p:nvSpPr>
               <p:cNvPr id="3" name="Content Placeholder 2">
@@ -15365,7 +15457,7 @@
             </p:txBody>
           </p:sp>
         </mc:Choice>
-        <mc:Fallback>
+        <mc:Fallback xmlns="">
           <p:sp>
             <p:nvSpPr>
               <p:cNvPr id="3" name="Content Placeholder 2">
@@ -15587,7 +15679,13 @@
           <a:p>
             <a:r>
               <a:rPr lang="en-US" dirty="0"/>
-              <a:t>Other Model Selection Methods </a:t>
+              <a:t>Other Model Selection Methods</a:t>
+            </a:r>
+          </a:p>
+          <a:p>
+            <a:r>
+              <a:rPr lang="en-US" dirty="0"/>
+              <a:t>In-Class Exercise:  Audio Pitch Detection </a:t>
             </a:r>
           </a:p>
         </p:txBody>
@@ -15719,8 +15817,8 @@
           </a:p>
         </p:txBody>
       </p:sp>
-      <mc:AlternateContent xmlns:mc="http://schemas.openxmlformats.org/markup-compatibility/2006">
-        <mc:Choice xmlns:a14="http://schemas.microsoft.com/office/drawing/2010/main" Requires="a14">
+      <mc:AlternateContent xmlns:mc="http://schemas.openxmlformats.org/markup-compatibility/2006" xmlns:a14="http://schemas.microsoft.com/office/drawing/2010/main">
+        <mc:Choice Requires="a14">
           <p:sp>
             <p:nvSpPr>
               <p:cNvPr id="3" name="Content Placeholder 2">
@@ -15827,7 +15925,7 @@
             </p:txBody>
           </p:sp>
         </mc:Choice>
-        <mc:Fallback>
+        <mc:Fallback xmlns="">
           <p:sp>
             <p:nvSpPr>
               <p:cNvPr id="3" name="Content Placeholder 2">
@@ -16244,8 +16342,8 @@
           </a:p>
         </p:txBody>
       </p:sp>
-      <mc:AlternateContent xmlns:mc="http://schemas.openxmlformats.org/markup-compatibility/2006">
-        <mc:Choice xmlns:a14="http://schemas.microsoft.com/office/drawing/2010/main" Requires="a14">
+      <mc:AlternateContent xmlns:mc="http://schemas.openxmlformats.org/markup-compatibility/2006" xmlns:a14="http://schemas.microsoft.com/office/drawing/2010/main">
+        <mc:Choice Requires="a14">
           <p:sp>
             <p:nvSpPr>
               <p:cNvPr id="3" name="Content Placeholder 2">
@@ -16339,7 +16437,7 @@
             </p:txBody>
           </p:sp>
         </mc:Choice>
-        <mc:Fallback>
+        <mc:Fallback xmlns="">
           <p:sp>
             <p:nvSpPr>
               <p:cNvPr id="3" name="Content Placeholder 2">
@@ -16501,7 +16599,13 @@
           <a:p>
             <a:r>
               <a:rPr lang="en-US" dirty="0"/>
-              <a:t>Other Model Selection Methods </a:t>
+              <a:t>Other Model Selection Methods</a:t>
+            </a:r>
+          </a:p>
+          <a:p>
+            <a:r>
+              <a:rPr lang="en-US" dirty="0"/>
+              <a:t>In-Class Exercise:  Audio Pitch Detection </a:t>
             </a:r>
           </a:p>
         </p:txBody>
@@ -16537,7 +16641,7 @@
         </p:nvSpPr>
         <p:spPr>
           <a:xfrm>
-            <a:off x="314049" y="2801369"/>
+            <a:off x="271377" y="2776985"/>
             <a:ext cx="978408" cy="484632"/>
           </a:xfrm>
           <a:prstGeom prst="rightArrow">
@@ -16578,7 +16682,7 @@
     </p:spTree>
     <p:extLst>
       <p:ext uri="{BB962C8B-B14F-4D97-AF65-F5344CB8AC3E}">
-        <p14:creationId xmlns:p14="http://schemas.microsoft.com/office/powerpoint/2010/main" val="2622976753"/>
+        <p14:creationId xmlns:p14="http://schemas.microsoft.com/office/powerpoint/2010/main" val="106167147"/>
       </p:ext>
     </p:extLst>
   </p:cSld>
@@ -22260,7 +22364,13 @@
           <a:p>
             <a:r>
               <a:rPr lang="en-US" dirty="0"/>
-              <a:t>Other Model Selection Methods </a:t>
+              <a:t>Other Model Selection Methods</a:t>
+            </a:r>
+          </a:p>
+          <a:p>
+            <a:r>
+              <a:rPr lang="en-US" dirty="0"/>
+              <a:t>In-Class Exercise:  Audio Pitch Detection </a:t>
             </a:r>
           </a:p>
         </p:txBody>
@@ -22296,7 +22406,7 @@
         </p:nvSpPr>
         <p:spPr>
           <a:xfrm>
-            <a:off x="307953" y="3219553"/>
+            <a:off x="271377" y="3270761"/>
             <a:ext cx="978408" cy="484632"/>
           </a:xfrm>
           <a:prstGeom prst="rightArrow">
@@ -22337,7 +22447,7 @@
     </p:spTree>
     <p:extLst>
       <p:ext uri="{BB962C8B-B14F-4D97-AF65-F5344CB8AC3E}">
-        <p14:creationId xmlns:p14="http://schemas.microsoft.com/office/powerpoint/2010/main" val="1079867464"/>
+        <p14:creationId xmlns:p14="http://schemas.microsoft.com/office/powerpoint/2010/main" val="901143867"/>
       </p:ext>
     </p:extLst>
   </p:cSld>
@@ -23970,8 +24080,8 @@
           </a:p>
         </p:txBody>
       </p:sp>
-      <mc:AlternateContent xmlns:mc="http://schemas.openxmlformats.org/markup-compatibility/2006">
-        <mc:Choice xmlns:a14="http://schemas.microsoft.com/office/drawing/2010/main" Requires="a14">
+      <mc:AlternateContent xmlns:mc="http://schemas.openxmlformats.org/markup-compatibility/2006" xmlns:a14="http://schemas.microsoft.com/office/drawing/2010/main">
+        <mc:Choice Requires="a14">
           <p:sp>
             <p:nvSpPr>
               <p:cNvPr id="3" name="Content Placeholder 2">
@@ -24073,7 +24183,7 @@
             </p:txBody>
           </p:sp>
         </mc:Choice>
-        <mc:Fallback>
+        <mc:Fallback xmlns="">
           <p:sp>
             <p:nvSpPr>
               <p:cNvPr id="3" name="Content Placeholder 2">
@@ -25234,7 +25344,7 @@
           <a:p>
             <a:r>
               <a:rPr lang="en-US" dirty="0"/>
-              <a:t>What You Should Know to Do</a:t>
+              <a:t>Outline	</a:t>
             </a:r>
           </a:p>
         </p:txBody>
@@ -25256,81 +25366,38 @@
           <a:p>
             <a:r>
               <a:rPr lang="en-US" dirty="0"/>
-              <a:t>Formulate a linear estimation problem with a regularization</a:t>
+              <a:t>Motivating Example:  Predicting prostate cancer from a PSA test</a:t>
             </a:r>
           </a:p>
           <a:p>
             <a:r>
               <a:rPr lang="en-US" dirty="0"/>
-              <a:t>Compute an L1-regularized estimate (LASSO) using </a:t>
-            </a:r>
-            <a:r>
-              <a:rPr lang="en-US" dirty="0" err="1"/>
-              <a:t>sklearn</a:t>
-            </a:r>
+              <a:t>Model Selection </a:t>
+            </a:r>
+          </a:p>
+          <a:p>
             <a:r>
               <a:rPr lang="en-US" dirty="0"/>
-              <a:t> tools</a:t>
+              <a:t>Model Selection from LASSO regularization</a:t>
             </a:r>
           </a:p>
           <a:p>
             <a:r>
               <a:rPr lang="en-US" dirty="0"/>
-              <a:t>Compute the optimal regularization level using cross validation</a:t>
+              <a:t>Probabilistic interpretation</a:t>
             </a:r>
           </a:p>
           <a:p>
             <a:r>
               <a:rPr lang="en-US" dirty="0"/>
-              <a:t>Interpret results from a LASSO path</a:t>
+              <a:t>Other Model Selection Methods</a:t>
             </a:r>
           </a:p>
           <a:p>
             <a:r>
               <a:rPr lang="en-US" dirty="0"/>
-              <a:t>Determine final regression function from cross validation</a:t>
-            </a:r>
-          </a:p>
-          <a:p>
-            <a:r>
-              <a:rPr lang="en-US" dirty="0"/>
-              <a:t>Set </a:t>
-            </a:r>
-            <a:r>
-              <a:rPr lang="en-US" dirty="0" err="1"/>
-              <a:t>regularizer</a:t>
-            </a:r>
-            <a:r>
-              <a:rPr lang="en-US" dirty="0"/>
-              <a:t> based on a probabilistic prior</a:t>
-            </a:r>
-          </a:p>
-          <a:p>
-            <a:r>
-              <a:rPr lang="en-US" dirty="0"/>
-              <a:t>Perform other feature selection methods</a:t>
-            </a:r>
-          </a:p>
-          <a:p>
-            <a:pPr marL="0" indent="0">
-              <a:buNone/>
-            </a:pPr>
-            <a:endParaRPr lang="en-US" dirty="0"/>
-          </a:p>
-          <a:p>
-            <a:endParaRPr lang="en-US" dirty="0"/>
-          </a:p>
-          <a:p>
-            <a:endParaRPr lang="en-US" dirty="0"/>
-          </a:p>
-          <a:p>
-            <a:endParaRPr lang="en-US" dirty="0"/>
-          </a:p>
-          <a:p>
-            <a:endParaRPr lang="en-US" dirty="0"/>
-          </a:p>
-          <a:p>
-            <a:endParaRPr lang="en-US" dirty="0"/>
+              <a:t>In-Class Exercise:  Audio Pitch Detection </a:t>
+            </a:r>
           </a:p>
         </p:txBody>
       </p:sp>
@@ -25352,6 +25419,378 @@
             <a:fld id="{629637A9-119A-49DA-BD12-AAC58B377D80}" type="slidenum">
               <a:rPr lang="en-US" smtClean="0"/>
               <a:t>50</a:t>
+            </a:fld>
+            <a:endParaRPr lang="en-US" dirty="0"/>
+          </a:p>
+        </p:txBody>
+      </p:sp>
+      <p:sp>
+        <p:nvSpPr>
+          <p:cNvPr id="5" name="Arrow: Right 4"/>
+          <p:cNvSpPr/>
+          <p:nvPr/>
+        </p:nvSpPr>
+        <p:spPr>
+          <a:xfrm>
+            <a:off x="259185" y="3704185"/>
+            <a:ext cx="978408" cy="484632"/>
+          </a:xfrm>
+          <a:prstGeom prst="rightArrow">
+            <a:avLst/>
+          </a:prstGeom>
+          <a:solidFill>
+            <a:schemeClr val="accent1">
+              <a:lumMod val="60000"/>
+              <a:lumOff val="40000"/>
+            </a:schemeClr>
+          </a:solidFill>
+        </p:spPr>
+        <p:style>
+          <a:lnRef idx="2">
+            <a:schemeClr val="accent1">
+              <a:shade val="50000"/>
+            </a:schemeClr>
+          </a:lnRef>
+          <a:fillRef idx="1">
+            <a:schemeClr val="accent1"/>
+          </a:fillRef>
+          <a:effectRef idx="0">
+            <a:schemeClr val="accent1"/>
+          </a:effectRef>
+          <a:fontRef idx="minor">
+            <a:schemeClr val="lt1"/>
+          </a:fontRef>
+        </p:style>
+        <p:txBody>
+          <a:bodyPr rtlCol="0" anchor="ctr"/>
+          <a:lstStyle/>
+          <a:p>
+            <a:pPr algn="ctr"/>
+            <a:endParaRPr lang="en-US"/>
+          </a:p>
+        </p:txBody>
+      </p:sp>
+    </p:spTree>
+    <p:extLst>
+      <p:ext uri="{BB962C8B-B14F-4D97-AF65-F5344CB8AC3E}">
+        <p14:creationId xmlns:p14="http://schemas.microsoft.com/office/powerpoint/2010/main" val="4128388545"/>
+      </p:ext>
+    </p:extLst>
+  </p:cSld>
+  <p:clrMapOvr>
+    <a:masterClrMapping/>
+  </p:clrMapOvr>
+</p:sld>
+</file>
+
+<file path=ppt/slides/slide51.xml><?xml version="1.0" encoding="utf-8"?>
+<p:sld xmlns:a="http://schemas.openxmlformats.org/drawingml/2006/main" xmlns:r="http://schemas.openxmlformats.org/officeDocument/2006/relationships" xmlns:p="http://schemas.openxmlformats.org/presentationml/2006/main">
+  <p:cSld>
+    <p:spTree>
+      <p:nvGrpSpPr>
+        <p:cNvPr id="1" name=""/>
+        <p:cNvGrpSpPr/>
+        <p:nvPr/>
+      </p:nvGrpSpPr>
+      <p:grpSpPr>
+        <a:xfrm>
+          <a:off x="0" y="0"/>
+          <a:ext cx="0" cy="0"/>
+          <a:chOff x="0" y="0"/>
+          <a:chExt cx="0" cy="0"/>
+        </a:xfrm>
+      </p:grpSpPr>
+      <p:sp>
+        <p:nvSpPr>
+          <p:cNvPr id="2" name="Title 1">
+            <a:extLst>
+              <a:ext uri="{FF2B5EF4-FFF2-40B4-BE49-F238E27FC236}">
+                <a16:creationId xmlns:a16="http://schemas.microsoft.com/office/drawing/2014/main" id="{0F95548F-7B12-4082-A122-C4448CD30CFB}"/>
+              </a:ext>
+            </a:extLst>
+          </p:cNvPr>
+          <p:cNvSpPr>
+            <a:spLocks noGrp="1"/>
+          </p:cNvSpPr>
+          <p:nvPr>
+            <p:ph type="title"/>
+          </p:nvPr>
+        </p:nvSpPr>
+        <p:spPr/>
+        <p:txBody>
+          <a:bodyPr/>
+          <a:lstStyle/>
+          <a:p>
+            <a:r>
+              <a:rPr lang="en-US" dirty="0"/>
+              <a:t>In Class Exercise</a:t>
+            </a:r>
+          </a:p>
+        </p:txBody>
+      </p:sp>
+      <p:sp>
+        <p:nvSpPr>
+          <p:cNvPr id="3" name="Content Placeholder 2">
+            <a:extLst>
+              <a:ext uri="{FF2B5EF4-FFF2-40B4-BE49-F238E27FC236}">
+                <a16:creationId xmlns:a16="http://schemas.microsoft.com/office/drawing/2014/main" id="{931C2E9E-7782-41BC-90A1-B179EC1BD1A5}"/>
+              </a:ext>
+            </a:extLst>
+          </p:cNvPr>
+          <p:cNvSpPr>
+            <a:spLocks noGrp="1"/>
+          </p:cNvSpPr>
+          <p:nvPr>
+            <p:ph idx="1"/>
+          </p:nvPr>
+        </p:nvSpPr>
+        <p:spPr>
+          <a:xfrm>
+            <a:off x="1097280" y="1539277"/>
+            <a:ext cx="10058400" cy="740627"/>
+          </a:xfrm>
+        </p:spPr>
+        <p:txBody>
+          <a:bodyPr/>
+          <a:lstStyle/>
+          <a:p>
+            <a:r>
+              <a:rPr lang="en-US" dirty="0">
+                <a:hlinkClick r:id="rId2"/>
+              </a:rPr>
+              <a:t>https://github.com/sdrangan/introml/blob/master/unit05_lasso/lasso_in_class.ipynb</a:t>
+            </a:r>
+            <a:endParaRPr lang="en-US" dirty="0"/>
+          </a:p>
+          <a:p>
+            <a:endParaRPr lang="en-US" dirty="0"/>
+          </a:p>
+        </p:txBody>
+      </p:sp>
+      <p:sp>
+        <p:nvSpPr>
+          <p:cNvPr id="4" name="Slide Number Placeholder 3">
+            <a:extLst>
+              <a:ext uri="{FF2B5EF4-FFF2-40B4-BE49-F238E27FC236}">
+                <a16:creationId xmlns:a16="http://schemas.microsoft.com/office/drawing/2014/main" id="{BE9630EA-BAD9-4628-BB33-03B4F3848F28}"/>
+              </a:ext>
+            </a:extLst>
+          </p:cNvPr>
+          <p:cNvSpPr>
+            <a:spLocks noGrp="1"/>
+          </p:cNvSpPr>
+          <p:nvPr>
+            <p:ph type="sldNum" sz="quarter" idx="12"/>
+          </p:nvPr>
+        </p:nvSpPr>
+        <p:spPr/>
+        <p:txBody>
+          <a:bodyPr/>
+          <a:lstStyle/>
+          <a:p>
+            <a:fld id="{629637A9-119A-49DA-BD12-AAC58B377D80}" type="slidenum">
+              <a:rPr lang="en-US" smtClean="0"/>
+              <a:t>51</a:t>
+            </a:fld>
+            <a:endParaRPr lang="en-US" dirty="0"/>
+          </a:p>
+        </p:txBody>
+      </p:sp>
+      <p:pic>
+        <p:nvPicPr>
+          <p:cNvPr id="6" name="Picture 5">
+            <a:extLst>
+              <a:ext uri="{FF2B5EF4-FFF2-40B4-BE49-F238E27FC236}">
+                <a16:creationId xmlns:a16="http://schemas.microsoft.com/office/drawing/2014/main" id="{BA3A6BA7-1258-482C-A416-2D730178AF42}"/>
+              </a:ext>
+            </a:extLst>
+          </p:cNvPr>
+          <p:cNvPicPr>
+            <a:picLocks noChangeAspect="1"/>
+          </p:cNvPicPr>
+          <p:nvPr/>
+        </p:nvPicPr>
+        <p:blipFill>
+          <a:blip r:embed="rId3"/>
+          <a:stretch>
+            <a:fillRect/>
+          </a:stretch>
+        </p:blipFill>
+        <p:spPr>
+          <a:xfrm>
+            <a:off x="1036320" y="2081212"/>
+            <a:ext cx="7762875" cy="3990975"/>
+          </a:xfrm>
+          <a:prstGeom prst="rect">
+            <a:avLst/>
+          </a:prstGeom>
+        </p:spPr>
+      </p:pic>
+    </p:spTree>
+    <p:extLst>
+      <p:ext uri="{BB962C8B-B14F-4D97-AF65-F5344CB8AC3E}">
+        <p14:creationId xmlns:p14="http://schemas.microsoft.com/office/powerpoint/2010/main" val="2011892382"/>
+      </p:ext>
+    </p:extLst>
+  </p:cSld>
+  <p:clrMapOvr>
+    <a:masterClrMapping/>
+  </p:clrMapOvr>
+</p:sld>
+</file>
+
+<file path=ppt/slides/slide52.xml><?xml version="1.0" encoding="utf-8"?>
+<p:sld xmlns:a="http://schemas.openxmlformats.org/drawingml/2006/main" xmlns:r="http://schemas.openxmlformats.org/officeDocument/2006/relationships" xmlns:p="http://schemas.openxmlformats.org/presentationml/2006/main">
+  <p:cSld>
+    <p:spTree>
+      <p:nvGrpSpPr>
+        <p:cNvPr id="1" name=""/>
+        <p:cNvGrpSpPr/>
+        <p:nvPr/>
+      </p:nvGrpSpPr>
+      <p:grpSpPr>
+        <a:xfrm>
+          <a:off x="0" y="0"/>
+          <a:ext cx="0" cy="0"/>
+          <a:chOff x="0" y="0"/>
+          <a:chExt cx="0" cy="0"/>
+        </a:xfrm>
+      </p:grpSpPr>
+      <p:sp>
+        <p:nvSpPr>
+          <p:cNvPr id="2" name="Title 1"/>
+          <p:cNvSpPr>
+            <a:spLocks noGrp="1"/>
+          </p:cNvSpPr>
+          <p:nvPr>
+            <p:ph type="title"/>
+          </p:nvPr>
+        </p:nvSpPr>
+        <p:spPr/>
+        <p:txBody>
+          <a:bodyPr/>
+          <a:lstStyle/>
+          <a:p>
+            <a:r>
+              <a:rPr lang="en-US" dirty="0"/>
+              <a:t>What You Should Know to Do</a:t>
+            </a:r>
+          </a:p>
+        </p:txBody>
+      </p:sp>
+      <p:sp>
+        <p:nvSpPr>
+          <p:cNvPr id="3" name="Content Placeholder 2"/>
+          <p:cNvSpPr>
+            <a:spLocks noGrp="1"/>
+          </p:cNvSpPr>
+          <p:nvPr>
+            <p:ph idx="1"/>
+          </p:nvPr>
+        </p:nvSpPr>
+        <p:spPr/>
+        <p:txBody>
+          <a:bodyPr/>
+          <a:lstStyle/>
+          <a:p>
+            <a:r>
+              <a:rPr lang="en-US" dirty="0"/>
+              <a:t>Formulate a linear estimation problem with a regularization</a:t>
+            </a:r>
+          </a:p>
+          <a:p>
+            <a:r>
+              <a:rPr lang="en-US" dirty="0"/>
+              <a:t>Compute an L1-regularized estimate (LASSO) using </a:t>
+            </a:r>
+            <a:r>
+              <a:rPr lang="en-US" dirty="0" err="1"/>
+              <a:t>sklearn</a:t>
+            </a:r>
+            <a:r>
+              <a:rPr lang="en-US" dirty="0"/>
+              <a:t> tools</a:t>
+            </a:r>
+          </a:p>
+          <a:p>
+            <a:r>
+              <a:rPr lang="en-US" dirty="0"/>
+              <a:t>Compute the optimal regularization level using cross validation</a:t>
+            </a:r>
+          </a:p>
+          <a:p>
+            <a:r>
+              <a:rPr lang="en-US" dirty="0"/>
+              <a:t>Interpret results from a LASSO path</a:t>
+            </a:r>
+          </a:p>
+          <a:p>
+            <a:r>
+              <a:rPr lang="en-US" dirty="0"/>
+              <a:t>Determine final regression function from cross validation</a:t>
+            </a:r>
+          </a:p>
+          <a:p>
+            <a:r>
+              <a:rPr lang="en-US" dirty="0"/>
+              <a:t>Set </a:t>
+            </a:r>
+            <a:r>
+              <a:rPr lang="en-US" dirty="0" err="1"/>
+              <a:t>regularizer</a:t>
+            </a:r>
+            <a:r>
+              <a:rPr lang="en-US" dirty="0"/>
+              <a:t> based on a probabilistic prior</a:t>
+            </a:r>
+          </a:p>
+          <a:p>
+            <a:r>
+              <a:rPr lang="en-US" dirty="0"/>
+              <a:t>Perform other feature selection methods</a:t>
+            </a:r>
+          </a:p>
+          <a:p>
+            <a:pPr marL="0" indent="0">
+              <a:buNone/>
+            </a:pPr>
+            <a:endParaRPr lang="en-US" dirty="0"/>
+          </a:p>
+          <a:p>
+            <a:endParaRPr lang="en-US" dirty="0"/>
+          </a:p>
+          <a:p>
+            <a:endParaRPr lang="en-US" dirty="0"/>
+          </a:p>
+          <a:p>
+            <a:endParaRPr lang="en-US" dirty="0"/>
+          </a:p>
+          <a:p>
+            <a:endParaRPr lang="en-US" dirty="0"/>
+          </a:p>
+          <a:p>
+            <a:endParaRPr lang="en-US" dirty="0"/>
+          </a:p>
+        </p:txBody>
+      </p:sp>
+      <p:sp>
+        <p:nvSpPr>
+          <p:cNvPr id="4" name="Slide Number Placeholder 3"/>
+          <p:cNvSpPr>
+            <a:spLocks noGrp="1"/>
+          </p:cNvSpPr>
+          <p:nvPr>
+            <p:ph type="sldNum" sz="quarter" idx="12"/>
+          </p:nvPr>
+        </p:nvSpPr>
+        <p:spPr/>
+        <p:txBody>
+          <a:bodyPr/>
+          <a:lstStyle/>
+          <a:p>
+            <a:fld id="{629637A9-119A-49DA-BD12-AAC58B377D80}" type="slidenum">
+              <a:rPr lang="en-US" smtClean="0"/>
+              <a:t>52</a:t>
             </a:fld>
             <a:endParaRPr lang="en-US" dirty="0"/>
           </a:p>
@@ -26029,8 +26468,8 @@
           </a:p>
         </p:txBody>
       </p:sp>
-      <mc:AlternateContent xmlns:mc="http://schemas.openxmlformats.org/markup-compatibility/2006">
-        <mc:Choice xmlns:a14="http://schemas.microsoft.com/office/drawing/2010/main" Requires="a14">
+      <mc:AlternateContent xmlns:mc="http://schemas.openxmlformats.org/markup-compatibility/2006" xmlns:a14="http://schemas.microsoft.com/office/drawing/2010/main">
+        <mc:Choice Requires="a14">
           <p:sp>
             <p:nvSpPr>
               <p:cNvPr id="3" name="Content Placeholder 2">
@@ -26119,7 +26558,7 @@
             </p:txBody>
           </p:sp>
         </mc:Choice>
-        <mc:Fallback>
+        <mc:Fallback xmlns="">
           <p:sp>
             <p:nvSpPr>
               <p:cNvPr id="3" name="Content Placeholder 2">
@@ -26306,8 +26745,8 @@
           </a:p>
         </p:txBody>
       </p:sp>
-      <mc:AlternateContent xmlns:mc="http://schemas.openxmlformats.org/markup-compatibility/2006">
-        <mc:Choice xmlns:a14="http://schemas.microsoft.com/office/drawing/2010/main" Requires="a14">
+      <mc:AlternateContent xmlns:mc="http://schemas.openxmlformats.org/markup-compatibility/2006" xmlns:a14="http://schemas.microsoft.com/office/drawing/2010/main">
+        <mc:Choice Requires="a14">
           <p:sp>
             <p:nvSpPr>
               <p:cNvPr id="3" name="Content Placeholder 2">
@@ -26609,7 +27048,7 @@
             </p:txBody>
           </p:sp>
         </mc:Choice>
-        <mc:Fallback>
+        <mc:Fallback xmlns="">
           <p:sp>
             <p:nvSpPr>
               <p:cNvPr id="3" name="Content Placeholder 2">
@@ -26865,7 +27304,13 @@
           <a:p>
             <a:r>
               <a:rPr lang="en-US" dirty="0"/>
-              <a:t>Other Model Selection Methods </a:t>
+              <a:t>Other Model Selection Methods</a:t>
+            </a:r>
+          </a:p>
+          <a:p>
+            <a:r>
+              <a:rPr lang="en-US" dirty="0"/>
+              <a:t>In-Class Exercise:  Audio Pitch Detection </a:t>
             </a:r>
           </a:p>
         </p:txBody>
@@ -26901,7 +27346,7 @@
         </p:nvSpPr>
         <p:spPr>
           <a:xfrm>
-            <a:off x="314049" y="1911353"/>
+            <a:off x="283569" y="1880873"/>
             <a:ext cx="978408" cy="484632"/>
           </a:xfrm>
           <a:prstGeom prst="rightArrow">
@@ -26942,7 +27387,7 @@
     </p:spTree>
     <p:extLst>
       <p:ext uri="{BB962C8B-B14F-4D97-AF65-F5344CB8AC3E}">
-        <p14:creationId xmlns:p14="http://schemas.microsoft.com/office/powerpoint/2010/main" val="337271186"/>
+        <p14:creationId xmlns:p14="http://schemas.microsoft.com/office/powerpoint/2010/main" val="935259536"/>
       </p:ext>
     </p:extLst>
   </p:cSld>

</xml_diff>